<commit_message>
corrección de errata en las diapositivas
</commit_message>
<xml_diff>
--- a/ALERTAS DE ECG.pptx
+++ b/ALERTAS DE ECG.pptx
@@ -319,7 +319,7 @@
           <a:p>
             <a:fld id="{C534B696-5184-483F-B353-382DB75A78CA}" type="datetimeFigureOut">
               <a:rPr lang="es-ES" smtClean="0"/>
-              <a:t>02/12/2025</a:t>
+              <a:t>03/12/2025</a:t>
             </a:fld>
             <a:endParaRPr lang="es-ES"/>
           </a:p>
@@ -755,7 +755,7 @@
           <a:p>
             <a:fld id="{C534B696-5184-483F-B353-382DB75A78CA}" type="datetimeFigureOut">
               <a:rPr lang="es-ES" smtClean="0"/>
-              <a:t>02/12/2025</a:t>
+              <a:t>03/12/2025</a:t>
             </a:fld>
             <a:endParaRPr lang="es-ES"/>
           </a:p>
@@ -1005,7 +1005,7 @@
           <a:p>
             <a:fld id="{C534B696-5184-483F-B353-382DB75A78CA}" type="datetimeFigureOut">
               <a:rPr lang="es-ES" smtClean="0"/>
-              <a:t>02/12/2025</a:t>
+              <a:t>03/12/2025</a:t>
             </a:fld>
             <a:endParaRPr lang="es-ES"/>
           </a:p>
@@ -1313,7 +1313,7 @@
           <a:p>
             <a:fld id="{C534B696-5184-483F-B353-382DB75A78CA}" type="datetimeFigureOut">
               <a:rPr lang="es-ES" smtClean="0"/>
-              <a:t>02/12/2025</a:t>
+              <a:t>03/12/2025</a:t>
             </a:fld>
             <a:endParaRPr lang="es-ES"/>
           </a:p>
@@ -1631,7 +1631,7 @@
           <a:p>
             <a:fld id="{C534B696-5184-483F-B353-382DB75A78CA}" type="datetimeFigureOut">
               <a:rPr lang="es-ES" smtClean="0"/>
-              <a:t>02/12/2025</a:t>
+              <a:t>03/12/2025</a:t>
             </a:fld>
             <a:endParaRPr lang="es-ES"/>
           </a:p>
@@ -1933,7 +1933,7 @@
           <a:p>
             <a:fld id="{C534B696-5184-483F-B353-382DB75A78CA}" type="datetimeFigureOut">
               <a:rPr lang="es-ES" smtClean="0"/>
-              <a:t>02/12/2025</a:t>
+              <a:t>03/12/2025</a:t>
             </a:fld>
             <a:endParaRPr lang="es-ES"/>
           </a:p>
@@ -2300,7 +2300,7 @@
           <a:p>
             <a:fld id="{C534B696-5184-483F-B353-382DB75A78CA}" type="datetimeFigureOut">
               <a:rPr lang="es-ES" smtClean="0"/>
-              <a:t>02/12/2025</a:t>
+              <a:t>03/12/2025</a:t>
             </a:fld>
             <a:endParaRPr lang="es-ES"/>
           </a:p>
@@ -2474,7 +2474,7 @@
           <a:p>
             <a:fld id="{C534B696-5184-483F-B353-382DB75A78CA}" type="datetimeFigureOut">
               <a:rPr lang="es-ES" smtClean="0"/>
-              <a:t>02/12/2025</a:t>
+              <a:t>03/12/2025</a:t>
             </a:fld>
             <a:endParaRPr lang="es-ES"/>
           </a:p>
@@ -2654,7 +2654,7 @@
           <a:p>
             <a:fld id="{C534B696-5184-483F-B353-382DB75A78CA}" type="datetimeFigureOut">
               <a:rPr lang="es-ES" smtClean="0"/>
-              <a:t>02/12/2025</a:t>
+              <a:t>03/12/2025</a:t>
             </a:fld>
             <a:endParaRPr lang="es-ES"/>
           </a:p>
@@ -2824,7 +2824,7 @@
           <a:p>
             <a:fld id="{C534B696-5184-483F-B353-382DB75A78CA}" type="datetimeFigureOut">
               <a:rPr lang="es-ES" smtClean="0"/>
-              <a:t>02/12/2025</a:t>
+              <a:t>03/12/2025</a:t>
             </a:fld>
             <a:endParaRPr lang="es-ES"/>
           </a:p>
@@ -3074,7 +3074,7 @@
           <a:p>
             <a:fld id="{C534B696-5184-483F-B353-382DB75A78CA}" type="datetimeFigureOut">
               <a:rPr lang="es-ES" smtClean="0"/>
-              <a:t>02/12/2025</a:t>
+              <a:t>03/12/2025</a:t>
             </a:fld>
             <a:endParaRPr lang="es-ES"/>
           </a:p>
@@ -3310,7 +3310,7 @@
           <a:p>
             <a:fld id="{C534B696-5184-483F-B353-382DB75A78CA}" type="datetimeFigureOut">
               <a:rPr lang="es-ES" smtClean="0"/>
-              <a:t>02/12/2025</a:t>
+              <a:t>03/12/2025</a:t>
             </a:fld>
             <a:endParaRPr lang="es-ES"/>
           </a:p>
@@ -3692,7 +3692,7 @@
           <a:p>
             <a:fld id="{C534B696-5184-483F-B353-382DB75A78CA}" type="datetimeFigureOut">
               <a:rPr lang="es-ES" smtClean="0"/>
-              <a:t>02/12/2025</a:t>
+              <a:t>03/12/2025</a:t>
             </a:fld>
             <a:endParaRPr lang="es-ES"/>
           </a:p>
@@ -3810,7 +3810,7 @@
           <a:p>
             <a:fld id="{C534B696-5184-483F-B353-382DB75A78CA}" type="datetimeFigureOut">
               <a:rPr lang="es-ES" smtClean="0"/>
-              <a:t>02/12/2025</a:t>
+              <a:t>03/12/2025</a:t>
             </a:fld>
             <a:endParaRPr lang="es-ES"/>
           </a:p>
@@ -3905,7 +3905,7 @@
           <a:p>
             <a:fld id="{C534B696-5184-483F-B353-382DB75A78CA}" type="datetimeFigureOut">
               <a:rPr lang="es-ES" smtClean="0"/>
-              <a:t>02/12/2025</a:t>
+              <a:t>03/12/2025</a:t>
             </a:fld>
             <a:endParaRPr lang="es-ES"/>
           </a:p>
@@ -4160,7 +4160,7 @@
           <a:p>
             <a:fld id="{C534B696-5184-483F-B353-382DB75A78CA}" type="datetimeFigureOut">
               <a:rPr lang="es-ES" smtClean="0"/>
-              <a:t>02/12/2025</a:t>
+              <a:t>03/12/2025</a:t>
             </a:fld>
             <a:endParaRPr lang="es-ES"/>
           </a:p>
@@ -4443,7 +4443,7 @@
           <a:p>
             <a:fld id="{C534B696-5184-483F-B353-382DB75A78CA}" type="datetimeFigureOut">
               <a:rPr lang="es-ES" smtClean="0"/>
-              <a:t>02/12/2025</a:t>
+              <a:t>03/12/2025</a:t>
             </a:fld>
             <a:endParaRPr lang="es-ES"/>
           </a:p>
@@ -4849,7 +4849,7 @@
           <a:p>
             <a:fld id="{C534B696-5184-483F-B353-382DB75A78CA}" type="datetimeFigureOut">
               <a:rPr lang="es-ES" smtClean="0"/>
-              <a:t>02/12/2025</a:t>
+              <a:t>03/12/2025</a:t>
             </a:fld>
             <a:endParaRPr lang="es-ES"/>
           </a:p>
@@ -5763,7 +5763,7 @@
                 <a:ea typeface="Calibri" panose="020F0502020204030204" pitchFamily="34" charset="0"/>
                 <a:cs typeface="Calibri" panose="020F0502020204030204" pitchFamily="34" charset="0"/>
               </a:rPr>
-              <a:t>REGLAS: REGLAS DE COMPLEJOS - ENFERMEDADES</a:t>
+              <a:t>REGLAS: REGLAS DE DIAGNÓSTICO - ENFERMEDADES</a:t>
             </a:r>
           </a:p>
         </p:txBody>
@@ -5982,7 +5982,7 @@
                 <a:ea typeface="Calibri" panose="020F0502020204030204" pitchFamily="34" charset="0"/>
                 <a:cs typeface="Calibri" panose="020F0502020204030204" pitchFamily="34" charset="0"/>
               </a:rPr>
-              <a:t>REGLAS: REGLAS DE COMPLEJOS - ENFERMEDADES</a:t>
+              <a:t>REGLAS: REGLAS DE DIAGNÓSTICO - ENFERMEDADES</a:t>
             </a:r>
           </a:p>
         </p:txBody>
@@ -6132,7 +6132,7 @@
                 <a:ea typeface="Calibri" panose="020F0502020204030204" pitchFamily="34" charset="0"/>
                 <a:cs typeface="Calibri" panose="020F0502020204030204" pitchFamily="34" charset="0"/>
               </a:rPr>
-              <a:t>REGLAS: REGLAS DE COMPLEJOS - ENFERMEDADES</a:t>
+              <a:t>REGLAS: REGLAS DE DIAGNÓSTICO - ENFERMEDADES</a:t>
             </a:r>
           </a:p>
         </p:txBody>
@@ -6282,7 +6282,7 @@
                 <a:ea typeface="Calibri" panose="020F0502020204030204" pitchFamily="34" charset="0"/>
                 <a:cs typeface="Calibri" panose="020F0502020204030204" pitchFamily="34" charset="0"/>
               </a:rPr>
-              <a:t>REGLAS: REGLAS DE COMPLEJOS - ENFERMEDADES</a:t>
+              <a:t>REGLAS: REGLAS DE DIAGNÓSTICO - ENFERMEDADES</a:t>
             </a:r>
           </a:p>
         </p:txBody>
@@ -6432,7 +6432,7 @@
                 <a:ea typeface="Calibri" panose="020F0502020204030204" pitchFamily="34" charset="0"/>
                 <a:cs typeface="Calibri" panose="020F0502020204030204" pitchFamily="34" charset="0"/>
               </a:rPr>
-              <a:t>REGLAS: REGLAS DE COMPLEJOS - ENFERMEDADES</a:t>
+              <a:t>REGLAS: REGLAS DE DIAGNÓSTICO - ENFERMEDADES</a:t>
             </a:r>
           </a:p>
         </p:txBody>
@@ -6582,7 +6582,7 @@
                 <a:ea typeface="Calibri" panose="020F0502020204030204" pitchFamily="34" charset="0"/>
                 <a:cs typeface="Calibri" panose="020F0502020204030204" pitchFamily="34" charset="0"/>
               </a:rPr>
-              <a:t>REGLAS: REGLAS DE COMPLEJOS - ENFERMEDADES</a:t>
+              <a:t>REGLAS: REGLAS DE DIAGNÓSTICO - ENFERMEDADES</a:t>
             </a:r>
           </a:p>
         </p:txBody>
@@ -8092,7 +8092,7 @@
               <a:buNone/>
             </a:pPr>
             <a:r>
-              <a:rPr lang="es-ES" sz="3200" dirty="0">
+              <a:rPr lang="es-ES" sz="3200" b="1" dirty="0">
                 <a:solidFill>
                   <a:schemeClr val="tx1"/>
                 </a:solidFill>

</xml_diff>